<commit_message>
updated figure 10 (pipeline_io.png) and its editable version
</commit_message>
<xml_diff>
--- a/teachopencadd/talktorials/T018_automated_cadd_pipeline/images/editable_images/pipeline_io.pptx
+++ b/teachopencadd/talktorials/T018_automated_cadd_pipeline/images/editable_images/pipeline_io.pptx
@@ -261,7 +261,7 @@
           <a:p>
             <a:fld id="{239667B5-7A13-2D49-AA39-A0442D0834BF}" type="datetimeFigureOut">
               <a:rPr lang="en-US" smtClean="0"/>
-              <a:t>11/3/21</a:t>
+              <a:t>11/14/21</a:t>
             </a:fld>
             <a:endParaRPr lang="en-US"/>
           </a:p>
@@ -461,7 +461,7 @@
           <a:p>
             <a:fld id="{239667B5-7A13-2D49-AA39-A0442D0834BF}" type="datetimeFigureOut">
               <a:rPr lang="en-US" smtClean="0"/>
-              <a:t>11/3/21</a:t>
+              <a:t>11/14/21</a:t>
             </a:fld>
             <a:endParaRPr lang="en-US"/>
           </a:p>
@@ -671,7 +671,7 @@
           <a:p>
             <a:fld id="{239667B5-7A13-2D49-AA39-A0442D0834BF}" type="datetimeFigureOut">
               <a:rPr lang="en-US" smtClean="0"/>
-              <a:t>11/3/21</a:t>
+              <a:t>11/14/21</a:t>
             </a:fld>
             <a:endParaRPr lang="en-US"/>
           </a:p>
@@ -871,7 +871,7 @@
           <a:p>
             <a:fld id="{239667B5-7A13-2D49-AA39-A0442D0834BF}" type="datetimeFigureOut">
               <a:rPr lang="en-US" smtClean="0"/>
-              <a:t>11/3/21</a:t>
+              <a:t>11/14/21</a:t>
             </a:fld>
             <a:endParaRPr lang="en-US"/>
           </a:p>
@@ -1147,7 +1147,7 @@
           <a:p>
             <a:fld id="{239667B5-7A13-2D49-AA39-A0442D0834BF}" type="datetimeFigureOut">
               <a:rPr lang="en-US" smtClean="0"/>
-              <a:t>11/3/21</a:t>
+              <a:t>11/14/21</a:t>
             </a:fld>
             <a:endParaRPr lang="en-US"/>
           </a:p>
@@ -1415,7 +1415,7 @@
           <a:p>
             <a:fld id="{239667B5-7A13-2D49-AA39-A0442D0834BF}" type="datetimeFigureOut">
               <a:rPr lang="en-US" smtClean="0"/>
-              <a:t>11/3/21</a:t>
+              <a:t>11/14/21</a:t>
             </a:fld>
             <a:endParaRPr lang="en-US"/>
           </a:p>
@@ -1830,7 +1830,7 @@
           <a:p>
             <a:fld id="{239667B5-7A13-2D49-AA39-A0442D0834BF}" type="datetimeFigureOut">
               <a:rPr lang="en-US" smtClean="0"/>
-              <a:t>11/3/21</a:t>
+              <a:t>11/14/21</a:t>
             </a:fld>
             <a:endParaRPr lang="en-US"/>
           </a:p>
@@ -1972,7 +1972,7 @@
           <a:p>
             <a:fld id="{239667B5-7A13-2D49-AA39-A0442D0834BF}" type="datetimeFigureOut">
               <a:rPr lang="en-US" smtClean="0"/>
-              <a:t>11/3/21</a:t>
+              <a:t>11/14/21</a:t>
             </a:fld>
             <a:endParaRPr lang="en-US"/>
           </a:p>
@@ -2085,7 +2085,7 @@
           <a:p>
             <a:fld id="{239667B5-7A13-2D49-AA39-A0442D0834BF}" type="datetimeFigureOut">
               <a:rPr lang="en-US" smtClean="0"/>
-              <a:t>11/3/21</a:t>
+              <a:t>11/14/21</a:t>
             </a:fld>
             <a:endParaRPr lang="en-US"/>
           </a:p>
@@ -2398,7 +2398,7 @@
           <a:p>
             <a:fld id="{239667B5-7A13-2D49-AA39-A0442D0834BF}" type="datetimeFigureOut">
               <a:rPr lang="en-US" smtClean="0"/>
-              <a:t>11/3/21</a:t>
+              <a:t>11/14/21</a:t>
             </a:fld>
             <a:endParaRPr lang="en-US"/>
           </a:p>
@@ -2687,7 +2687,7 @@
           <a:p>
             <a:fld id="{239667B5-7A13-2D49-AA39-A0442D0834BF}" type="datetimeFigureOut">
               <a:rPr lang="en-US" smtClean="0"/>
-              <a:t>11/3/21</a:t>
+              <a:t>11/14/21</a:t>
             </a:fld>
             <a:endParaRPr lang="en-US"/>
           </a:p>
@@ -2930,7 +2930,7 @@
           <a:p>
             <a:fld id="{239667B5-7A13-2D49-AA39-A0442D0834BF}" type="datetimeFigureOut">
               <a:rPr lang="en-US" smtClean="0"/>
-              <a:t>11/3/21</a:t>
+              <a:t>11/14/21</a:t>
             </a:fld>
             <a:endParaRPr lang="en-US"/>
           </a:p>
@@ -3347,202 +3347,244 @@
           <a:chExt cx="0" cy="0"/>
         </a:xfrm>
       </p:grpSpPr>
-      <p:sp>
-        <p:nvSpPr>
-          <p:cNvPr id="5" name="Right Arrow 4">
-            <a:extLst>
-              <a:ext uri="{FF2B5EF4-FFF2-40B4-BE49-F238E27FC236}">
-                <a16:creationId xmlns:a16="http://schemas.microsoft.com/office/drawing/2014/main" id="{22115C95-5E27-9C4D-8690-9696CB73BD6E}"/>
-              </a:ext>
-            </a:extLst>
-          </p:cNvPr>
-          <p:cNvSpPr/>
+      <p:grpSp>
+        <p:nvGrpSpPr>
+          <p:cNvPr id="16" name="Group 15">
+            <a:extLst>
+              <a:ext uri="{FF2B5EF4-FFF2-40B4-BE49-F238E27FC236}">
+                <a16:creationId xmlns:a16="http://schemas.microsoft.com/office/drawing/2014/main" id="{9FF72770-E977-ED42-8C8D-D24D1CA9362B}"/>
+              </a:ext>
+            </a:extLst>
+          </p:cNvPr>
+          <p:cNvGrpSpPr/>
           <p:nvPr/>
-        </p:nvSpPr>
-        <p:spPr>
+        </p:nvGrpSpPr>
+        <p:grpSpPr>
           <a:xfrm>
-            <a:off x="3282877" y="2636532"/>
-            <a:ext cx="937072" cy="304354"/>
+            <a:off x="3555939" y="2394267"/>
+            <a:ext cx="937072" cy="546619"/>
+            <a:chOff x="3282877" y="2394267"/>
+            <a:chExt cx="937072" cy="546619"/>
           </a:xfrm>
-          <a:prstGeom prst="rightArrow">
-            <a:avLst/>
-          </a:prstGeom>
-        </p:spPr>
-        <p:style>
-          <a:lnRef idx="2">
-            <a:schemeClr val="accent1">
-              <a:shade val="50000"/>
-            </a:schemeClr>
-          </a:lnRef>
-          <a:fillRef idx="1">
-            <a:schemeClr val="accent1"/>
-          </a:fillRef>
-          <a:effectRef idx="0">
-            <a:schemeClr val="accent1"/>
-          </a:effectRef>
-          <a:fontRef idx="minor">
-            <a:schemeClr val="lt1"/>
-          </a:fontRef>
-        </p:style>
-        <p:txBody>
-          <a:bodyPr rtlCol="0" anchor="ctr"/>
-          <a:lstStyle/>
-          <a:p>
-            <a:pPr algn="ctr"/>
-            <a:endParaRPr lang="en-US"/>
-          </a:p>
-        </p:txBody>
-      </p:sp>
-      <p:sp>
-        <p:nvSpPr>
-          <p:cNvPr id="6" name="Right Arrow 5">
-            <a:extLst>
-              <a:ext uri="{FF2B5EF4-FFF2-40B4-BE49-F238E27FC236}">
-                <a16:creationId xmlns:a16="http://schemas.microsoft.com/office/drawing/2014/main" id="{64FD0883-3640-E644-9714-0C875D2311F9}"/>
-              </a:ext>
-            </a:extLst>
-          </p:cNvPr>
-          <p:cNvSpPr/>
+        </p:grpSpPr>
+        <p:sp>
+          <p:nvSpPr>
+            <p:cNvPr id="5" name="Right Arrow 4">
+              <a:extLst>
+                <a:ext uri="{FF2B5EF4-FFF2-40B4-BE49-F238E27FC236}">
+                  <a16:creationId xmlns:a16="http://schemas.microsoft.com/office/drawing/2014/main" id="{22115C95-5E27-9C4D-8690-9696CB73BD6E}"/>
+                </a:ext>
+              </a:extLst>
+            </p:cNvPr>
+            <p:cNvSpPr/>
+            <p:nvPr/>
+          </p:nvSpPr>
+          <p:spPr>
+            <a:xfrm>
+              <a:off x="3282877" y="2636532"/>
+              <a:ext cx="937072" cy="304354"/>
+            </a:xfrm>
+            <a:prstGeom prst="rightArrow">
+              <a:avLst/>
+            </a:prstGeom>
+          </p:spPr>
+          <p:style>
+            <a:lnRef idx="2">
+              <a:schemeClr val="accent1">
+                <a:shade val="50000"/>
+              </a:schemeClr>
+            </a:lnRef>
+            <a:fillRef idx="1">
+              <a:schemeClr val="accent1"/>
+            </a:fillRef>
+            <a:effectRef idx="0">
+              <a:schemeClr val="accent1"/>
+            </a:effectRef>
+            <a:fontRef idx="minor">
+              <a:schemeClr val="lt1"/>
+            </a:fontRef>
+          </p:style>
+          <p:txBody>
+            <a:bodyPr rtlCol="0" anchor="ctr"/>
+            <a:lstStyle/>
+            <a:p>
+              <a:pPr algn="ctr"/>
+              <a:endParaRPr lang="en-US"/>
+            </a:p>
+          </p:txBody>
+        </p:sp>
+        <p:sp>
+          <p:nvSpPr>
+            <p:cNvPr id="7" name="TextBox 6">
+              <a:extLst>
+                <a:ext uri="{FF2B5EF4-FFF2-40B4-BE49-F238E27FC236}">
+                  <a16:creationId xmlns:a16="http://schemas.microsoft.com/office/drawing/2014/main" id="{DD51E89F-8E1D-F343-95BE-A69858A47170}"/>
+                </a:ext>
+              </a:extLst>
+            </p:cNvPr>
+            <p:cNvSpPr txBox="1"/>
+            <p:nvPr/>
+          </p:nvSpPr>
+          <p:spPr>
+            <a:xfrm>
+              <a:off x="3300877" y="2394267"/>
+              <a:ext cx="723275" cy="323165"/>
+            </a:xfrm>
+            <a:prstGeom prst="rect">
+              <a:avLst/>
+            </a:prstGeom>
+            <a:noFill/>
+          </p:spPr>
+          <p:txBody>
+            <a:bodyPr wrap="none" rtlCol="0">
+              <a:spAutoFit/>
+            </a:bodyPr>
+            <a:lstStyle/>
+            <a:p>
+              <a:r>
+                <a:rPr lang="en-US" sz="1500" dirty="0">
+                  <a:latin typeface="Helvetica" pitchFamily="2" charset="0"/>
+                </a:rPr>
+                <a:t>1</a:t>
+              </a:r>
+              <a:r>
+                <a:rPr lang="en-US" sz="1500" baseline="30000" dirty="0">
+                  <a:latin typeface="Helvetica" pitchFamily="2" charset="0"/>
+                </a:rPr>
+                <a:t>st</a:t>
+              </a:r>
+              <a:r>
+                <a:rPr lang="en-US" sz="1500" dirty="0">
+                  <a:latin typeface="Helvetica" pitchFamily="2" charset="0"/>
+                </a:rPr>
+                <a:t> run</a:t>
+              </a:r>
+            </a:p>
+          </p:txBody>
+        </p:sp>
+      </p:grpSp>
+      <p:grpSp>
+        <p:nvGrpSpPr>
+          <p:cNvPr id="15" name="Group 14">
+            <a:extLst>
+              <a:ext uri="{FF2B5EF4-FFF2-40B4-BE49-F238E27FC236}">
+                <a16:creationId xmlns:a16="http://schemas.microsoft.com/office/drawing/2014/main" id="{0889BA80-ABC0-EE48-913F-F6DA9DD8FAE5}"/>
+              </a:ext>
+            </a:extLst>
+          </p:cNvPr>
+          <p:cNvGrpSpPr/>
           <p:nvPr/>
-        </p:nvSpPr>
-        <p:spPr>
+        </p:nvGrpSpPr>
+        <p:grpSpPr>
           <a:xfrm>
-            <a:off x="7756473" y="2636532"/>
-            <a:ext cx="937072" cy="304354"/>
+            <a:off x="8368316" y="2394267"/>
+            <a:ext cx="940362" cy="546619"/>
+            <a:chOff x="7753183" y="2394267"/>
+            <a:chExt cx="940362" cy="546619"/>
           </a:xfrm>
-          <a:prstGeom prst="rightArrow">
-            <a:avLst/>
-          </a:prstGeom>
-        </p:spPr>
-        <p:style>
-          <a:lnRef idx="2">
-            <a:schemeClr val="accent1">
-              <a:shade val="50000"/>
-            </a:schemeClr>
-          </a:lnRef>
-          <a:fillRef idx="1">
-            <a:schemeClr val="accent1"/>
-          </a:fillRef>
-          <a:effectRef idx="0">
-            <a:schemeClr val="accent1"/>
-          </a:effectRef>
-          <a:fontRef idx="minor">
-            <a:schemeClr val="lt1"/>
-          </a:fontRef>
-        </p:style>
-        <p:txBody>
-          <a:bodyPr rtlCol="0" anchor="ctr"/>
-          <a:lstStyle/>
-          <a:p>
-            <a:pPr algn="ctr"/>
-            <a:endParaRPr lang="en-US"/>
-          </a:p>
-        </p:txBody>
-      </p:sp>
-      <p:sp>
-        <p:nvSpPr>
-          <p:cNvPr id="7" name="TextBox 6">
-            <a:extLst>
-              <a:ext uri="{FF2B5EF4-FFF2-40B4-BE49-F238E27FC236}">
-                <a16:creationId xmlns:a16="http://schemas.microsoft.com/office/drawing/2014/main" id="{DD51E89F-8E1D-F343-95BE-A69858A47170}"/>
-              </a:ext>
-            </a:extLst>
-          </p:cNvPr>
-          <p:cNvSpPr txBox="1"/>
-          <p:nvPr/>
-        </p:nvSpPr>
-        <p:spPr>
-          <a:xfrm>
-            <a:off x="3224680" y="2394267"/>
-            <a:ext cx="851515" cy="323165"/>
-          </a:xfrm>
-          <a:prstGeom prst="rect">
-            <a:avLst/>
-          </a:prstGeom>
-          <a:noFill/>
-        </p:spPr>
-        <p:txBody>
-          <a:bodyPr wrap="none" rtlCol="0">
-            <a:spAutoFit/>
-          </a:bodyPr>
-          <a:lstStyle/>
-          <a:p>
-            <a:r>
-              <a:rPr lang="en-US" sz="1500" dirty="0">
-                <a:latin typeface="Helvetica" pitchFamily="2" charset="0"/>
-              </a:rPr>
-              <a:t>1</a:t>
-            </a:r>
-            <a:r>
-              <a:rPr lang="en-US" sz="1500" baseline="30000" dirty="0">
-                <a:latin typeface="Helvetica" pitchFamily="2" charset="0"/>
-              </a:rPr>
-              <a:t>st</a:t>
-            </a:r>
-            <a:r>
-              <a:rPr lang="en-US" sz="1500" dirty="0">
-                <a:latin typeface="Helvetica" pitchFamily="2" charset="0"/>
-              </a:rPr>
-              <a:t>. Run</a:t>
-            </a:r>
-          </a:p>
-        </p:txBody>
-      </p:sp>
-      <p:sp>
-        <p:nvSpPr>
-          <p:cNvPr id="8" name="TextBox 7">
-            <a:extLst>
-              <a:ext uri="{FF2B5EF4-FFF2-40B4-BE49-F238E27FC236}">
-                <a16:creationId xmlns:a16="http://schemas.microsoft.com/office/drawing/2014/main" id="{7F9D54FA-45A8-6447-92EE-5A4053751A87}"/>
-              </a:ext>
-            </a:extLst>
-          </p:cNvPr>
-          <p:cNvSpPr txBox="1"/>
-          <p:nvPr/>
-        </p:nvSpPr>
-        <p:spPr>
-          <a:xfrm>
-            <a:off x="7676982" y="2394267"/>
-            <a:ext cx="893193" cy="323165"/>
-          </a:xfrm>
-          <a:prstGeom prst="rect">
-            <a:avLst/>
-          </a:prstGeom>
-          <a:noFill/>
-        </p:spPr>
-        <p:txBody>
-          <a:bodyPr wrap="none" rtlCol="0">
-            <a:spAutoFit/>
-          </a:bodyPr>
-          <a:lstStyle/>
-          <a:p>
-            <a:r>
-              <a:rPr lang="en-US" sz="1500" dirty="0">
-                <a:latin typeface="Helvetica" pitchFamily="2" charset="0"/>
-              </a:rPr>
-              <a:t>2</a:t>
-            </a:r>
-            <a:r>
-              <a:rPr lang="en-US" sz="1500" baseline="30000" dirty="0">
-                <a:latin typeface="Helvetica" pitchFamily="2" charset="0"/>
-              </a:rPr>
-              <a:t>nd</a:t>
-            </a:r>
-            <a:r>
-              <a:rPr lang="en-US" sz="1500" dirty="0">
-                <a:latin typeface="Helvetica" pitchFamily="2" charset="0"/>
-              </a:rPr>
-              <a:t>. Run</a:t>
-            </a:r>
-          </a:p>
-        </p:txBody>
-      </p:sp>
+        </p:grpSpPr>
+        <p:sp>
+          <p:nvSpPr>
+            <p:cNvPr id="6" name="Right Arrow 5">
+              <a:extLst>
+                <a:ext uri="{FF2B5EF4-FFF2-40B4-BE49-F238E27FC236}">
+                  <a16:creationId xmlns:a16="http://schemas.microsoft.com/office/drawing/2014/main" id="{64FD0883-3640-E644-9714-0C875D2311F9}"/>
+                </a:ext>
+              </a:extLst>
+            </p:cNvPr>
+            <p:cNvSpPr/>
+            <p:nvPr/>
+          </p:nvSpPr>
+          <p:spPr>
+            <a:xfrm>
+              <a:off x="7756473" y="2636532"/>
+              <a:ext cx="937072" cy="304354"/>
+            </a:xfrm>
+            <a:prstGeom prst="rightArrow">
+              <a:avLst/>
+            </a:prstGeom>
+          </p:spPr>
+          <p:style>
+            <a:lnRef idx="2">
+              <a:schemeClr val="accent1">
+                <a:shade val="50000"/>
+              </a:schemeClr>
+            </a:lnRef>
+            <a:fillRef idx="1">
+              <a:schemeClr val="accent1"/>
+            </a:fillRef>
+            <a:effectRef idx="0">
+              <a:schemeClr val="accent1"/>
+            </a:effectRef>
+            <a:fontRef idx="minor">
+              <a:schemeClr val="lt1"/>
+            </a:fontRef>
+          </p:style>
+          <p:txBody>
+            <a:bodyPr rtlCol="0" anchor="ctr"/>
+            <a:lstStyle/>
+            <a:p>
+              <a:pPr algn="ctr"/>
+              <a:endParaRPr lang="en-US"/>
+            </a:p>
+          </p:txBody>
+        </p:sp>
+        <p:sp>
+          <p:nvSpPr>
+            <p:cNvPr id="8" name="TextBox 7">
+              <a:extLst>
+                <a:ext uri="{FF2B5EF4-FFF2-40B4-BE49-F238E27FC236}">
+                  <a16:creationId xmlns:a16="http://schemas.microsoft.com/office/drawing/2014/main" id="{7F9D54FA-45A8-6447-92EE-5A4053751A87}"/>
+                </a:ext>
+              </a:extLst>
+            </p:cNvPr>
+            <p:cNvSpPr txBox="1"/>
+            <p:nvPr/>
+          </p:nvSpPr>
+          <p:spPr>
+            <a:xfrm>
+              <a:off x="7753183" y="2394267"/>
+              <a:ext cx="764953" cy="323165"/>
+            </a:xfrm>
+            <a:prstGeom prst="rect">
+              <a:avLst/>
+            </a:prstGeom>
+            <a:noFill/>
+          </p:spPr>
+          <p:txBody>
+            <a:bodyPr wrap="none" rtlCol="0">
+              <a:spAutoFit/>
+            </a:bodyPr>
+            <a:lstStyle/>
+            <a:p>
+              <a:r>
+                <a:rPr lang="en-US" sz="1500" dirty="0">
+                  <a:latin typeface="Helvetica" pitchFamily="2" charset="0"/>
+                </a:rPr>
+                <a:t>2</a:t>
+              </a:r>
+              <a:r>
+                <a:rPr lang="en-US" sz="1500" baseline="30000" dirty="0">
+                  <a:latin typeface="Helvetica" pitchFamily="2" charset="0"/>
+                </a:rPr>
+                <a:t>nd</a:t>
+              </a:r>
+              <a:r>
+                <a:rPr lang="en-US" sz="1500" dirty="0">
+                  <a:latin typeface="Helvetica" pitchFamily="2" charset="0"/>
+                </a:rPr>
+                <a:t> run</a:t>
+              </a:r>
+            </a:p>
+          </p:txBody>
+        </p:sp>
+      </p:grpSp>
       <p:pic>
         <p:nvPicPr>
-          <p:cNvPr id="9" name="Picture 8">
-            <a:extLst>
-              <a:ext uri="{FF2B5EF4-FFF2-40B4-BE49-F238E27FC236}">
-                <a16:creationId xmlns:a16="http://schemas.microsoft.com/office/drawing/2014/main" id="{EA9EFE7A-5F0A-A041-B3EE-C31DD51C3FFD}"/>
+          <p:cNvPr id="4" name="Picture 3">
+            <a:extLst>
+              <a:ext uri="{FF2B5EF4-FFF2-40B4-BE49-F238E27FC236}">
+                <a16:creationId xmlns:a16="http://schemas.microsoft.com/office/drawing/2014/main" id="{59AB1090-A89C-174C-AD3B-09436DBE6A5C}"/>
               </a:ext>
             </a:extLst>
           </p:cNvPr>
@@ -3559,8 +3601,8 @@
         </p:blipFill>
         <p:spPr>
           <a:xfrm>
-            <a:off x="340234" y="1858254"/>
-            <a:ext cx="2310289" cy="2862000"/>
+            <a:off x="18262" y="1516828"/>
+            <a:ext cx="3086131" cy="2879240"/>
           </a:xfrm>
           <a:prstGeom prst="rect">
             <a:avLst/>
@@ -3569,10 +3611,10 @@
       </p:pic>
       <p:pic>
         <p:nvPicPr>
-          <p:cNvPr id="11" name="Picture 10">
-            <a:extLst>
-              <a:ext uri="{FF2B5EF4-FFF2-40B4-BE49-F238E27FC236}">
-                <a16:creationId xmlns:a16="http://schemas.microsoft.com/office/drawing/2014/main" id="{1D94DACD-D31E-2049-BE51-33CAA07C6B49}"/>
+          <p:cNvPr id="12" name="Picture 11">
+            <a:extLst>
+              <a:ext uri="{FF2B5EF4-FFF2-40B4-BE49-F238E27FC236}">
+                <a16:creationId xmlns:a16="http://schemas.microsoft.com/office/drawing/2014/main" id="{E7F2A2BA-6E17-D047-B465-1924427C7F56}"/>
               </a:ext>
             </a:extLst>
           </p:cNvPr>
@@ -3589,8 +3631,8 @@
         </p:blipFill>
         <p:spPr>
           <a:xfrm>
-            <a:off x="9370283" y="1551274"/>
-            <a:ext cx="2393958" cy="3168980"/>
+            <a:off x="5416439" y="1216425"/>
+            <a:ext cx="1963386" cy="3179643"/>
           </a:xfrm>
           <a:prstGeom prst="rect">
             <a:avLst/>
@@ -3599,10 +3641,10 @@
       </p:pic>
       <p:pic>
         <p:nvPicPr>
-          <p:cNvPr id="2" name="Picture 1">
-            <a:extLst>
-              <a:ext uri="{FF2B5EF4-FFF2-40B4-BE49-F238E27FC236}">
-                <a16:creationId xmlns:a16="http://schemas.microsoft.com/office/drawing/2014/main" id="{50A9FF52-6FCF-6A4F-B470-DD3A9F0ACAF1}"/>
+          <p:cNvPr id="14" name="Picture 13">
+            <a:extLst>
+              <a:ext uri="{FF2B5EF4-FFF2-40B4-BE49-F238E27FC236}">
+                <a16:creationId xmlns:a16="http://schemas.microsoft.com/office/drawing/2014/main" id="{065FEF01-48C4-7542-88A0-953384C01206}"/>
               </a:ext>
             </a:extLst>
           </p:cNvPr>
@@ -3619,8 +3661,8 @@
         </p:blipFill>
         <p:spPr>
           <a:xfrm>
-            <a:off x="4896687" y="1516828"/>
-            <a:ext cx="2393958" cy="3203426"/>
+            <a:off x="10122993" y="1258748"/>
+            <a:ext cx="2045325" cy="3137320"/>
           </a:xfrm>
           <a:prstGeom prst="rect">
             <a:avLst/>

</xml_diff>